<commit_message>
First iteration of Lecture 3, some updates to Lecture 2
</commit_message>
<xml_diff>
--- a/Lecture_2/images/PSF_examples.pptx
+++ b/Lecture_2/images/PSF_examples.pptx
@@ -104,6 +104,22 @@
       </a:defRPr>
     </a:lvl9pPr>
   </p:defaultTextStyle>
+  <p:extLst>
+    <p:ext uri="{EFAFB233-063F-42B5-8137-9DF3F51BA10A}">
+      <p15:sldGuideLst xmlns:p15="http://schemas.microsoft.com/office/powerpoint/2012/main">
+        <p15:guide id="1" orient="horz" pos="2834">
+          <p15:clr>
+            <a:srgbClr val="A4A3A4"/>
+          </p15:clr>
+        </p15:guide>
+        <p15:guide id="2" pos="2834">
+          <p15:clr>
+            <a:srgbClr val="A4A3A4"/>
+          </p15:clr>
+        </p15:guide>
+      </p15:sldGuideLst>
+    </p:ext>
+  </p:extLst>
 </p:presentation>
 </file>
 
@@ -288,7 +304,7 @@
           <a:p>
             <a:fld id="{528F79B3-D70B-7F4B-A322-41B9AD7FD2BB}" type="datetimeFigureOut">
               <a:rPr lang="en-US" smtClean="0"/>
-              <a:t>13/02/18</a:t>
+              <a:t>2/14/18</a:t>
             </a:fld>
             <a:endParaRPr lang="en-US"/>
           </a:p>
@@ -458,7 +474,7 @@
           <a:p>
             <a:fld id="{528F79B3-D70B-7F4B-A322-41B9AD7FD2BB}" type="datetimeFigureOut">
               <a:rPr lang="en-US" smtClean="0"/>
-              <a:t>13/02/18</a:t>
+              <a:t>2/14/18</a:t>
             </a:fld>
             <a:endParaRPr lang="en-US"/>
           </a:p>
@@ -638,7 +654,7 @@
           <a:p>
             <a:fld id="{528F79B3-D70B-7F4B-A322-41B9AD7FD2BB}" type="datetimeFigureOut">
               <a:rPr lang="en-US" smtClean="0"/>
-              <a:t>13/02/18</a:t>
+              <a:t>2/14/18</a:t>
             </a:fld>
             <a:endParaRPr lang="en-US"/>
           </a:p>
@@ -808,7 +824,7 @@
           <a:p>
             <a:fld id="{528F79B3-D70B-7F4B-A322-41B9AD7FD2BB}" type="datetimeFigureOut">
               <a:rPr lang="en-US" smtClean="0"/>
-              <a:t>13/02/18</a:t>
+              <a:t>2/14/18</a:t>
             </a:fld>
             <a:endParaRPr lang="en-US"/>
           </a:p>
@@ -1054,7 +1070,7 @@
           <a:p>
             <a:fld id="{528F79B3-D70B-7F4B-A322-41B9AD7FD2BB}" type="datetimeFigureOut">
               <a:rPr lang="en-US" smtClean="0"/>
-              <a:t>13/02/18</a:t>
+              <a:t>2/14/18</a:t>
             </a:fld>
             <a:endParaRPr lang="en-US"/>
           </a:p>
@@ -1342,7 +1358,7 @@
           <a:p>
             <a:fld id="{528F79B3-D70B-7F4B-A322-41B9AD7FD2BB}" type="datetimeFigureOut">
               <a:rPr lang="en-US" smtClean="0"/>
-              <a:t>13/02/18</a:t>
+              <a:t>2/14/18</a:t>
             </a:fld>
             <a:endParaRPr lang="en-US"/>
           </a:p>
@@ -1764,7 +1780,7 @@
           <a:p>
             <a:fld id="{528F79B3-D70B-7F4B-A322-41B9AD7FD2BB}" type="datetimeFigureOut">
               <a:rPr lang="en-US" smtClean="0"/>
-              <a:t>13/02/18</a:t>
+              <a:t>2/14/18</a:t>
             </a:fld>
             <a:endParaRPr lang="en-US"/>
           </a:p>
@@ -1882,7 +1898,7 @@
           <a:p>
             <a:fld id="{528F79B3-D70B-7F4B-A322-41B9AD7FD2BB}" type="datetimeFigureOut">
               <a:rPr lang="en-US" smtClean="0"/>
-              <a:t>13/02/18</a:t>
+              <a:t>2/14/18</a:t>
             </a:fld>
             <a:endParaRPr lang="en-US"/>
           </a:p>
@@ -1977,7 +1993,7 @@
           <a:p>
             <a:fld id="{528F79B3-D70B-7F4B-A322-41B9AD7FD2BB}" type="datetimeFigureOut">
               <a:rPr lang="en-US" smtClean="0"/>
-              <a:t>13/02/18</a:t>
+              <a:t>2/14/18</a:t>
             </a:fld>
             <a:endParaRPr lang="en-US"/>
           </a:p>
@@ -2254,7 +2270,7 @@
           <a:p>
             <a:fld id="{528F79B3-D70B-7F4B-A322-41B9AD7FD2BB}" type="datetimeFigureOut">
               <a:rPr lang="en-US" smtClean="0"/>
-              <a:t>13/02/18</a:t>
+              <a:t>2/14/18</a:t>
             </a:fld>
             <a:endParaRPr lang="en-US"/>
           </a:p>
@@ -2507,7 +2523,7 @@
           <a:p>
             <a:fld id="{528F79B3-D70B-7F4B-A322-41B9AD7FD2BB}" type="datetimeFigureOut">
               <a:rPr lang="en-US" smtClean="0"/>
-              <a:t>13/02/18</a:t>
+              <a:t>2/14/18</a:t>
             </a:fld>
             <a:endParaRPr lang="en-US"/>
           </a:p>
@@ -2720,7 +2736,7 @@
           <a:p>
             <a:fld id="{528F79B3-D70B-7F4B-A322-41B9AD7FD2BB}" type="datetimeFigureOut">
               <a:rPr lang="en-US" smtClean="0"/>
-              <a:t>13/02/18</a:t>
+              <a:t>2/14/18</a:t>
             </a:fld>
             <a:endParaRPr lang="en-US"/>
           </a:p>
@@ -3364,6 +3380,52 @@
           </a:p>
         </p:txBody>
       </p:sp>
+      <p:sp>
+        <p:nvSpPr>
+          <p:cNvPr id="2" name="Left Arrow 1"/>
+          <p:cNvSpPr/>
+          <p:nvPr/>
+        </p:nvSpPr>
+        <p:spPr>
+          <a:xfrm>
+            <a:off x="8195733" y="1591733"/>
+            <a:ext cx="342740" cy="406400"/>
+          </a:xfrm>
+          <a:prstGeom prst="leftArrow">
+            <a:avLst/>
+          </a:prstGeom>
+          <a:solidFill>
+            <a:srgbClr val="FF0000"/>
+          </a:solidFill>
+          <a:ln>
+            <a:solidFill>
+              <a:srgbClr val="FF0000"/>
+            </a:solidFill>
+          </a:ln>
+        </p:spPr>
+        <p:style>
+          <a:lnRef idx="1">
+            <a:schemeClr val="accent1"/>
+          </a:lnRef>
+          <a:fillRef idx="3">
+            <a:schemeClr val="accent1"/>
+          </a:fillRef>
+          <a:effectRef idx="2">
+            <a:schemeClr val="accent1"/>
+          </a:effectRef>
+          <a:fontRef idx="minor">
+            <a:schemeClr val="lt1"/>
+          </a:fontRef>
+        </p:style>
+        <p:txBody>
+          <a:bodyPr rtlCol="0" anchor="ctr"/>
+          <a:lstStyle/>
+          <a:p>
+            <a:pPr algn="ctr"/>
+            <a:endParaRPr lang="en-US"/>
+          </a:p>
+        </p:txBody>
+      </p:sp>
     </p:spTree>
     <p:extLst>
       <p:ext uri="{BB962C8B-B14F-4D97-AF65-F5344CB8AC3E}">

</xml_diff>